<commit_message>
Updated stylesheet and slides
</commit_message>
<xml_diff>
--- a/slides/Word Suggestion Slides.pptx
+++ b/slides/Word Suggestion Slides.pptx
@@ -122,6 +122,11 @@
       </a:defRPr>
     </a:lvl9pPr>
   </p:defaultTextStyle>
+  <p:extLst>
+    <p:ext uri="{EFAFB233-063F-42B5-8137-9DF3F51BA10A}">
+      <p15:sldGuideLst xmlns:p15="http://schemas.microsoft.com/office/powerpoint/2012/main"/>
+    </p:ext>
+  </p:extLst>
 </p:presentation>
 </file>
 
@@ -272,7 +277,7 @@
           <a:p>
             <a:fld id="{287D138F-1951-4AF9-9DEC-930E53E677E5}" type="datetimeFigureOut">
               <a:rPr lang="en-US" smtClean="0"/>
-              <a:t>4/21/2019</a:t>
+              <a:t>4/22/2019</a:t>
             </a:fld>
             <a:endParaRPr lang="en-US"/>
           </a:p>
@@ -470,7 +475,7 @@
           <a:p>
             <a:fld id="{287D138F-1951-4AF9-9DEC-930E53E677E5}" type="datetimeFigureOut">
               <a:rPr lang="en-US" smtClean="0"/>
-              <a:t>4/21/2019</a:t>
+              <a:t>4/22/2019</a:t>
             </a:fld>
             <a:endParaRPr lang="en-US"/>
           </a:p>
@@ -678,7 +683,7 @@
           <a:p>
             <a:fld id="{287D138F-1951-4AF9-9DEC-930E53E677E5}" type="datetimeFigureOut">
               <a:rPr lang="en-US" smtClean="0"/>
-              <a:t>4/21/2019</a:t>
+              <a:t>4/22/2019</a:t>
             </a:fld>
             <a:endParaRPr lang="en-US"/>
           </a:p>
@@ -876,7 +881,7 @@
           <a:p>
             <a:fld id="{287D138F-1951-4AF9-9DEC-930E53E677E5}" type="datetimeFigureOut">
               <a:rPr lang="en-US" smtClean="0"/>
-              <a:t>4/21/2019</a:t>
+              <a:t>4/22/2019</a:t>
             </a:fld>
             <a:endParaRPr lang="en-US"/>
           </a:p>
@@ -1151,7 +1156,7 @@
           <a:p>
             <a:fld id="{287D138F-1951-4AF9-9DEC-930E53E677E5}" type="datetimeFigureOut">
               <a:rPr lang="en-US" smtClean="0"/>
-              <a:t>4/21/2019</a:t>
+              <a:t>4/22/2019</a:t>
             </a:fld>
             <a:endParaRPr lang="en-US"/>
           </a:p>
@@ -1416,7 +1421,7 @@
           <a:p>
             <a:fld id="{287D138F-1951-4AF9-9DEC-930E53E677E5}" type="datetimeFigureOut">
               <a:rPr lang="en-US" smtClean="0"/>
-              <a:t>4/21/2019</a:t>
+              <a:t>4/22/2019</a:t>
             </a:fld>
             <a:endParaRPr lang="en-US"/>
           </a:p>
@@ -1828,7 +1833,7 @@
           <a:p>
             <a:fld id="{287D138F-1951-4AF9-9DEC-930E53E677E5}" type="datetimeFigureOut">
               <a:rPr lang="en-US" smtClean="0"/>
-              <a:t>4/21/2019</a:t>
+              <a:t>4/22/2019</a:t>
             </a:fld>
             <a:endParaRPr lang="en-US"/>
           </a:p>
@@ -1969,7 +1974,7 @@
           <a:p>
             <a:fld id="{287D138F-1951-4AF9-9DEC-930E53E677E5}" type="datetimeFigureOut">
               <a:rPr lang="en-US" smtClean="0"/>
-              <a:t>4/21/2019</a:t>
+              <a:t>4/22/2019</a:t>
             </a:fld>
             <a:endParaRPr lang="en-US"/>
           </a:p>
@@ -2082,7 +2087,7 @@
           <a:p>
             <a:fld id="{287D138F-1951-4AF9-9DEC-930E53E677E5}" type="datetimeFigureOut">
               <a:rPr lang="en-US" smtClean="0"/>
-              <a:t>4/21/2019</a:t>
+              <a:t>4/22/2019</a:t>
             </a:fld>
             <a:endParaRPr lang="en-US"/>
           </a:p>
@@ -2393,7 +2398,7 @@
           <a:p>
             <a:fld id="{287D138F-1951-4AF9-9DEC-930E53E677E5}" type="datetimeFigureOut">
               <a:rPr lang="en-US" smtClean="0"/>
-              <a:t>4/21/2019</a:t>
+              <a:t>4/22/2019</a:t>
             </a:fld>
             <a:endParaRPr lang="en-US"/>
           </a:p>
@@ -2681,7 +2686,7 @@
           <a:p>
             <a:fld id="{287D138F-1951-4AF9-9DEC-930E53E677E5}" type="datetimeFigureOut">
               <a:rPr lang="en-US" smtClean="0"/>
-              <a:t>4/21/2019</a:t>
+              <a:t>4/22/2019</a:t>
             </a:fld>
             <a:endParaRPr lang="en-US"/>
           </a:p>
@@ -2922,7 +2927,7 @@
           <a:p>
             <a:fld id="{287D138F-1951-4AF9-9DEC-930E53E677E5}" type="datetimeFigureOut">
               <a:rPr lang="en-US" smtClean="0"/>
-              <a:t>4/21/2019</a:t>
+              <a:t>4/22/2019</a:t>
             </a:fld>
             <a:endParaRPr lang="en-US"/>
           </a:p>
@@ -3448,7 +3453,7 @@
           <a:p>
             <a:r>
               <a:rPr lang="en-US" dirty="0"/>
-              <a:t>First Demo</a:t>
+              <a:t>Demo 1</a:t>
             </a:r>
           </a:p>
         </p:txBody>
@@ -3522,7 +3527,7 @@
           <a:p>
             <a:r>
               <a:rPr lang="en-US" dirty="0"/>
-              <a:t>EX: “I'm kidding. You know how sometimes you just become this \"persona\"? And you don't know how to quit?”</a:t>
+              <a:t>EX: “I'm kidding. You know how sometimes you just become this persona and you don't know how to quit?”</a:t>
             </a:r>
           </a:p>
           <a:p>
@@ -3743,7 +3748,9 @@
         </p:nvSpPr>
         <p:spPr/>
         <p:txBody>
-          <a:bodyPr/>
+          <a:bodyPr>
+            <a:normAutofit/>
+          </a:bodyPr>
           <a:lstStyle/>
           <a:p>
             <a:r>
@@ -3755,8 +3762,21 @@
             <a:pPr lvl="1"/>
             <a:r>
               <a:rPr lang="en-US" dirty="0"/>
-              <a:t>Since user could have only entered few words, then intersection size is rather small for most datasets</a:t>
-            </a:r>
+              <a:t>Since user could have only entered few words, then intersection size is rather small for most datasets, and union size is large </a:t>
+            </a:r>
+          </a:p>
+          <a:p>
+            <a:pPr lvl="1"/>
+            <a:r>
+              <a:rPr lang="en-US" dirty="0"/>
+              <a:t>Jaccard similarity could be near 0</a:t>
+            </a:r>
+          </a:p>
+          <a:p>
+            <a:pPr marL="457200" lvl="1" indent="0">
+              <a:buNone/>
+            </a:pPr>
+            <a:endParaRPr lang="en-US" dirty="0"/>
           </a:p>
           <a:p>
             <a:r>
@@ -3775,7 +3795,7 @@
             <a:pPr lvl="1"/>
             <a:r>
               <a:rPr lang="en-US" dirty="0"/>
-              <a:t>The denominator is only length of query</a:t>
+              <a:t>The denominator is only length of query (not union of the two sets)</a:t>
             </a:r>
           </a:p>
           <a:p>
@@ -3823,8 +3843,8 @@
         </p:blipFill>
         <p:spPr>
           <a:xfrm>
-            <a:off x="6511457" y="2863963"/>
-            <a:ext cx="2464101" cy="689362"/>
+            <a:off x="6595348" y="3657600"/>
+            <a:ext cx="2489820" cy="696557"/>
           </a:xfrm>
           <a:prstGeom prst="rect">
             <a:avLst/>
@@ -4075,7 +4095,7 @@
         <p:spPr/>
         <p:txBody>
           <a:bodyPr>
-            <a:normAutofit/>
+            <a:normAutofit fontScale="92500" lnSpcReduction="20000"/>
           </a:bodyPr>
           <a:lstStyle/>
           <a:p>
@@ -4136,8 +4156,28 @@
             <a:pPr lvl="2"/>
             <a:r>
               <a:rPr lang="en-US" dirty="0"/>
-              <a:t>Update U’s RNN by training on the subset of data associated with P</a:t>
-            </a:r>
+              <a:t>Update U’s RNN by training on the subset of data associated with P </a:t>
+            </a:r>
+          </a:p>
+          <a:p>
+            <a:pPr lvl="1"/>
+            <a:r>
+              <a:rPr lang="en-US" dirty="0"/>
+              <a:t>(optional) update the U’s RNN with what the sequence of words the user as entered</a:t>
+            </a:r>
+          </a:p>
+          <a:p>
+            <a:pPr lvl="1"/>
+            <a:endParaRPr lang="en-US" dirty="0"/>
+          </a:p>
+          <a:p>
+            <a:r>
+              <a:rPr lang="en-US" dirty="0"/>
+              <a:t>EX: P = song lyrics and U picked the word from P’s RNN, train on the songs with similarity that had exceeded the similarity threshold</a:t>
+            </a:r>
+          </a:p>
+          <a:p>
+            <a:endParaRPr lang="en-US" dirty="0"/>
           </a:p>
         </p:txBody>
       </p:sp>
@@ -4238,6 +4278,12 @@
               <a:t>Give user suggestions that they would be likely to use before even saying them</a:t>
             </a:r>
           </a:p>
+          <a:p>
+            <a:r>
+              <a:rPr lang="en-US" dirty="0"/>
+              <a:t>Give suggestion that contains information that the user may want to use in a particular setting</a:t>
+            </a:r>
+          </a:p>
         </p:txBody>
       </p:sp>
     </p:spTree>
@@ -4342,21 +4388,17 @@
             </a:r>
             <a:r>
               <a:rPr lang="en-US" dirty="0"/>
-              <a:t> got the horses in the </a:t>
-            </a:r>
-            <a:r>
-              <a:rPr lang="en-US" dirty="0" err="1"/>
-              <a:t>backi</a:t>
-            </a:r>
-            <a:r>
-              <a:rPr lang="en-US" dirty="0"/>
-              <a:t> ”</a:t>
-            </a:r>
-          </a:p>
-          <a:p>
-            <a:r>
-              <a:rPr lang="en-US" dirty="0"/>
-              <a:t>EX: “I'm going to make him an offer he can't refuse.”</a:t>
+              <a:t> got the horses in the back”</a:t>
+            </a:r>
+          </a:p>
+          <a:p>
+            <a:r>
+              <a:rPr lang="en-US"/>
+              <a:t>EX: </a:t>
+            </a:r>
+            <a:r>
+              <a:rPr lang="en-US" dirty="0"/>
+              <a:t>“I'm going to make him an offer he can't refuse.”</a:t>
             </a:r>
           </a:p>
         </p:txBody>
@@ -4779,7 +4821,7 @@
           <a:p>
             <a:r>
               <a:rPr lang="en-US" dirty="0"/>
-              <a:t>Need to suggestion a word to a user</a:t>
+              <a:t>Need to suggest a word to a user</a:t>
             </a:r>
           </a:p>
           <a:p>
@@ -4898,19 +4940,33 @@
             <a:pPr lvl="1"/>
             <a:r>
               <a:rPr lang="en-US" dirty="0"/>
-              <a:t>LSTM (Long short-term memory)</a:t>
-            </a:r>
-          </a:p>
-          <a:p>
-            <a:r>
-              <a:rPr lang="en-US" dirty="0"/>
-              <a:t>(locality-sensitive hashing (LSH)/</a:t>
+              <a:t>Long Short-Term Memory (LSTM)</a:t>
+            </a:r>
+          </a:p>
+          <a:p>
+            <a:pPr lvl="1"/>
+            <a:r>
+              <a:rPr lang="en-US" dirty="0"/>
+              <a:t>Language model to predict next word given a sequence of words</a:t>
+            </a:r>
+          </a:p>
+          <a:p>
+            <a:r>
+              <a:rPr lang="en-US" dirty="0"/>
+              <a:t>Locality-Sensitive Hashing (LSH)/</a:t>
             </a:r>
             <a:r>
               <a:rPr lang="en-US" dirty="0" err="1"/>
-              <a:t>minhashing</a:t>
+              <a:t>Minhashing</a:t>
             </a:r>
             <a:endParaRPr lang="en-US" dirty="0"/>
+          </a:p>
+          <a:p>
+            <a:pPr lvl="1"/>
+            <a:r>
+              <a:rPr lang="en-US" dirty="0"/>
+              <a:t>Find similar users</a:t>
+            </a:r>
           </a:p>
           <a:p>
             <a:pPr lvl="1"/>
@@ -4999,7 +5055,7 @@
           <a:p>
             <a:r>
               <a:rPr lang="en-US" dirty="0"/>
-              <a:t>Used a json file of dialogue from movies to train the RNN model of the user</a:t>
+              <a:t>Dataset of dialogue from movies in a json file of to train the RNN model of the user</a:t>
             </a:r>
           </a:p>
           <a:p>
@@ -5137,7 +5193,7 @@
           <a:p>
             <a:r>
               <a:rPr lang="en-US" dirty="0"/>
-              <a:t>Mapped each word to a unique ID</a:t>
+              <a:t>Mapped each unique word to a unique ID</a:t>
             </a:r>
           </a:p>
           <a:p>
@@ -5227,7 +5283,9 @@
         </p:nvSpPr>
         <p:spPr/>
         <p:txBody>
-          <a:bodyPr/>
+          <a:bodyPr>
+            <a:normAutofit lnSpcReduction="10000"/>
+          </a:bodyPr>
           <a:lstStyle/>
           <a:p>
             <a:r>
@@ -5333,6 +5391,12 @@
             <a:r>
               <a:rPr lang="en-US" dirty="0"/>
               <a:t>Metrics: Categorical Accuracy</a:t>
+            </a:r>
+          </a:p>
+          <a:p>
+            <a:r>
+              <a:rPr lang="en-US" dirty="0"/>
+              <a:t>Vocab size is 10,000 so it learn additional words beyond initial words in given dataset</a:t>
             </a:r>
           </a:p>
         </p:txBody>
@@ -5414,7 +5478,7 @@
         <p:spPr/>
         <p:txBody>
           <a:bodyPr>
-            <a:normAutofit lnSpcReduction="10000"/>
+            <a:normAutofit fontScale="85000" lnSpcReduction="20000"/>
           </a:bodyPr>
           <a:lstStyle/>
           <a:p>
@@ -5523,6 +5587,19 @@
           <a:p>
             <a:r>
               <a:rPr lang="en-US" dirty="0"/>
+              <a:t>100 lines of dialogue as input</a:t>
+            </a:r>
+          </a:p>
+          <a:p>
+            <a:pPr lvl="1"/>
+            <a:r>
+              <a:rPr lang="en-US" dirty="0"/>
+              <a:t>While training segment into sizes from 1 to min(max sequence length, 40)</a:t>
+            </a:r>
+          </a:p>
+          <a:p>
+            <a:r>
+              <a:rPr lang="en-US" i="1" dirty="0"/>
               <a:t>(NOTE: This was only for the user RNN Network, others may vary)</a:t>
             </a:r>
           </a:p>
@@ -5673,7 +5750,7 @@
           <a:p>
             <a:r>
               <a:rPr lang="en-US" dirty="0"/>
-              <a:t>Using the Model</a:t>
+              <a:t>Input into the Model</a:t>
             </a:r>
           </a:p>
         </p:txBody>
@@ -5714,6 +5791,18 @@
             <a:r>
               <a:rPr lang="en-US" dirty="0"/>
               <a:t>Predict the next word in the sequence using the trained model</a:t>
+            </a:r>
+          </a:p>
+          <a:p>
+            <a:r>
+              <a:rPr lang="en-US" dirty="0"/>
+              <a:t>Transform the prediction ID back into text</a:t>
+            </a:r>
+          </a:p>
+          <a:p>
+            <a:r>
+              <a:rPr lang="en-US" dirty="0"/>
+              <a:t>EX: [“hello how are”] -&gt; [4, 12, 5] -&gt; (model) -&gt; [16] - &gt; you</a:t>
             </a:r>
           </a:p>
         </p:txBody>

</xml_diff>